<commit_message>
updated slides and spelling
</commit_message>
<xml_diff>
--- a/Hayden_deAlford_Wittlin_AdversarialBiasPosterFINAL.pptx
+++ b/Hayden_deAlford_Wittlin_AdversarialBiasPosterFINAL.pptx
@@ -4997,7 +4997,7 @@
           <a:graphicData uri="http://schemas.openxmlformats.org/presentationml/2006/ole">
             <mc:AlternateContent xmlns:mc="http://schemas.openxmlformats.org/markup-compatibility/2006">
               <mc:Choice xmlns:v="urn:schemas-microsoft-com:vml" Requires="v">
-                <p:oleObj spid="_x0000_s5186" name="Clip" r:id="rId6" imgW="20457143" imgH="13384127" progId="MS_ClipArt_Gallery.2">
+                <p:oleObj spid="_x0000_s5188" name="Clip" r:id="rId6" imgW="20457143" imgH="13384127" progId="MS_ClipArt_Gallery.2">
                   <p:embed/>
                 </p:oleObj>
               </mc:Choice>
@@ -10970,10 +10970,10 @@
       </p:graphicFrame>
       <p:pic>
         <p:nvPicPr>
-          <p:cNvPr id="4" name="Picture 3" descr="A picture containing clock&#10;&#10;Description automatically generated">
+          <p:cNvPr id="3" name="Picture 2" descr="A close up of a logo&#10;&#10;Description automatically generated">
             <a:extLst>
               <a:ext uri="{FF2B5EF4-FFF2-40B4-BE49-F238E27FC236}">
-                <a16:creationId xmlns:a16="http://schemas.microsoft.com/office/drawing/2014/main" id="{4A6A0B98-CACC-4C92-8610-78E38132B9E1}"/>
+                <a16:creationId xmlns:a16="http://schemas.microsoft.com/office/drawing/2014/main" id="{76FDAE8D-93EA-479D-A565-4DFDC367CE5F}"/>
               </a:ext>
             </a:extLst>
           </p:cNvPr>
@@ -10990,8 +10990,8 @@
         </p:blipFill>
         <p:spPr>
           <a:xfrm>
-            <a:off x="6226381" y="3893955"/>
-            <a:ext cx="3083825" cy="1793751"/>
+            <a:off x="6878783" y="3930650"/>
+            <a:ext cx="3200784" cy="1835738"/>
           </a:xfrm>
           <a:prstGeom prst="rect">
             <a:avLst/>

</xml_diff>